<commit_message>
Missed a title on the presentation
</commit_message>
<xml_diff>
--- a/Presentation/Inverse Kinematics and Particles.pptx
+++ b/Presentation/Inverse Kinematics and Particles.pptx
@@ -305,7 +305,7 @@
           <a:p>
             <a:fld id="{96DFF08F-DC6B-4601-B491-B0F83F6DD2DA}" type="datetimeFigureOut">
               <a:rPr lang="en-US" dirty="0"/>
-              <a:t>11/30/2015</a:t>
+              <a:t>12/1/2015</a:t>
             </a:fld>
             <a:endParaRPr lang="en-US" dirty="0"/>
           </a:p>
@@ -470,7 +470,7 @@
           <a:p>
             <a:fld id="{96DFF08F-DC6B-4601-B491-B0F83F6DD2DA}" type="datetimeFigureOut">
               <a:rPr lang="en-US" dirty="0"/>
-              <a:t>11/30/2015</a:t>
+              <a:t>12/1/2015</a:t>
             </a:fld>
             <a:endParaRPr lang="en-US" dirty="0"/>
           </a:p>
@@ -688,7 +688,7 @@
           <a:p>
             <a:fld id="{96DFF08F-DC6B-4601-B491-B0F83F6DD2DA}" type="datetimeFigureOut">
               <a:rPr lang="en-US" dirty="0"/>
-              <a:t>11/30/2015</a:t>
+              <a:t>12/1/2015</a:t>
             </a:fld>
             <a:endParaRPr lang="en-US" dirty="0"/>
           </a:p>
@@ -863,7 +863,7 @@
           <a:p>
             <a:fld id="{96DFF08F-DC6B-4601-B491-B0F83F6DD2DA}" type="datetimeFigureOut">
               <a:rPr lang="en-US" dirty="0"/>
-              <a:t>11/30/2015</a:t>
+              <a:t>12/1/2015</a:t>
             </a:fld>
             <a:endParaRPr lang="en-US" dirty="0"/>
           </a:p>
@@ -1160,7 +1160,7 @@
             <a:fld id="{96DFF08F-DC6B-4601-B491-B0F83F6DD2DA}" type="datetimeFigureOut">
               <a:rPr lang="en-US" dirty="0"/>
               <a:pPr/>
-              <a:t>11/30/2015</a:t>
+              <a:t>12/1/2015</a:t>
             </a:fld>
             <a:endParaRPr lang="en-US" dirty="0"/>
           </a:p>
@@ -1460,7 +1460,7 @@
           <a:p>
             <a:fld id="{96DFF08F-DC6B-4601-B491-B0F83F6DD2DA}" type="datetimeFigureOut">
               <a:rPr lang="en-US" dirty="0"/>
-              <a:t>11/30/2015</a:t>
+              <a:t>12/1/2015</a:t>
             </a:fld>
             <a:endParaRPr lang="en-US" dirty="0"/>
           </a:p>
@@ -1877,7 +1877,7 @@
           <a:p>
             <a:fld id="{96DFF08F-DC6B-4601-B491-B0F83F6DD2DA}" type="datetimeFigureOut">
               <a:rPr lang="en-US" dirty="0"/>
-              <a:t>11/30/2015</a:t>
+              <a:t>12/1/2015</a:t>
             </a:fld>
             <a:endParaRPr lang="en-US" dirty="0"/>
           </a:p>
@@ -1990,7 +1990,7 @@
           <a:p>
             <a:fld id="{96DFF08F-DC6B-4601-B491-B0F83F6DD2DA}" type="datetimeFigureOut">
               <a:rPr lang="en-US" dirty="0"/>
-              <a:t>11/30/2015</a:t>
+              <a:t>12/1/2015</a:t>
             </a:fld>
             <a:endParaRPr lang="en-US" dirty="0"/>
           </a:p>
@@ -2080,7 +2080,7 @@
           <a:p>
             <a:fld id="{96DFF08F-DC6B-4601-B491-B0F83F6DD2DA}" type="datetimeFigureOut">
               <a:rPr lang="en-US" dirty="0"/>
-              <a:t>11/30/2015</a:t>
+              <a:t>12/1/2015</a:t>
             </a:fld>
             <a:endParaRPr lang="en-US" dirty="0"/>
           </a:p>
@@ -2348,7 +2348,7 @@
           <a:p>
             <a:fld id="{96DFF08F-DC6B-4601-B491-B0F83F6DD2DA}" type="datetimeFigureOut">
               <a:rPr lang="en-US" dirty="0"/>
-              <a:t>11/30/2015</a:t>
+              <a:t>12/1/2015</a:t>
             </a:fld>
             <a:endParaRPr lang="en-US" dirty="0"/>
           </a:p>
@@ -2608,7 +2608,7 @@
           <a:p>
             <a:fld id="{96DFF08F-DC6B-4601-B491-B0F83F6DD2DA}" type="datetimeFigureOut">
               <a:rPr lang="en-US" dirty="0"/>
-              <a:t>11/30/2015</a:t>
+              <a:t>12/1/2015</a:t>
             </a:fld>
             <a:endParaRPr lang="en-US" dirty="0"/>
           </a:p>
@@ -2856,7 +2856,7 @@
             <a:fld id="{96DFF08F-DC6B-4601-B491-B0F83F6DD2DA}" type="datetimeFigureOut">
               <a:rPr lang="en-US" dirty="0"/>
               <a:pPr/>
-              <a:t>11/30/2015</a:t>
+              <a:t>12/1/2015</a:t>
             </a:fld>
             <a:endParaRPr lang="en-US" dirty="0"/>
           </a:p>
@@ -3466,8 +3466,8 @@
           </a:p>
         </p:txBody>
       </p:sp>
-      <mc:AlternateContent xmlns:mc="http://schemas.openxmlformats.org/markup-compatibility/2006">
-        <mc:Choice xmlns:a14="http://schemas.microsoft.com/office/drawing/2010/main" Requires="a14">
+      <mc:AlternateContent xmlns:mc="http://schemas.openxmlformats.org/markup-compatibility/2006" xmlns:a14="http://schemas.microsoft.com/office/drawing/2010/main">
+        <mc:Choice Requires="a14">
           <p:sp>
             <p:nvSpPr>
               <p:cNvPr id="3" name="Content Placeholder 2"/>
@@ -3864,7 +3864,7 @@
             </p:txBody>
           </p:sp>
         </mc:Choice>
-        <mc:Fallback>
+        <mc:Fallback xmlns="">
           <p:sp>
             <p:nvSpPr>
               <p:cNvPr id="3" name="Content Placeholder 2"/>
@@ -4296,8 +4296,8 @@
           </a:p>
         </p:txBody>
       </p:sp>
-      <mc:AlternateContent xmlns:mc="http://schemas.openxmlformats.org/markup-compatibility/2006">
-        <mc:Choice xmlns:a14="http://schemas.microsoft.com/office/drawing/2010/main" Requires="a14">
+      <mc:AlternateContent xmlns:mc="http://schemas.openxmlformats.org/markup-compatibility/2006" xmlns:a14="http://schemas.microsoft.com/office/drawing/2010/main">
+        <mc:Choice Requires="a14">
           <p:sp>
             <p:nvSpPr>
               <p:cNvPr id="25" name="TextBox 24"/>
@@ -4320,6 +4320,7 @@
               </a:bodyPr>
               <a:lstStyle/>
               <a:p>
+                <a:pPr/>
                 <a14:m>
                   <m:oMathPara xmlns:m="http://schemas.openxmlformats.org/officeDocument/2006/math">
                     <m:oMathParaPr>
@@ -4340,7 +4341,7 @@
             </p:txBody>
           </p:sp>
         </mc:Choice>
-        <mc:Fallback>
+        <mc:Fallback xmlns="">
           <p:sp>
             <p:nvSpPr>
               <p:cNvPr id="25" name="TextBox 24"/>
@@ -4379,8 +4380,8 @@
           </p:sp>
         </mc:Fallback>
       </mc:AlternateContent>
-      <mc:AlternateContent xmlns:mc="http://schemas.openxmlformats.org/markup-compatibility/2006">
-        <mc:Choice xmlns:a14="http://schemas.microsoft.com/office/drawing/2010/main" Requires="a14">
+      <mc:AlternateContent xmlns:mc="http://schemas.openxmlformats.org/markup-compatibility/2006" xmlns:a14="http://schemas.microsoft.com/office/drawing/2010/main">
+        <mc:Choice Requires="a14">
           <p:sp>
             <p:nvSpPr>
               <p:cNvPr id="26" name="TextBox 25"/>
@@ -4403,6 +4404,7 @@
               </a:bodyPr>
               <a:lstStyle/>
               <a:p>
+                <a:pPr/>
                 <a14:m>
                   <m:oMathPara xmlns:m="http://schemas.openxmlformats.org/officeDocument/2006/math">
                     <m:oMathParaPr>
@@ -4442,7 +4444,7 @@
             </p:txBody>
           </p:sp>
         </mc:Choice>
-        <mc:Fallback>
+        <mc:Fallback xmlns="">
           <p:sp>
             <p:nvSpPr>
               <p:cNvPr id="26" name="TextBox 25"/>
@@ -4731,7 +4733,11 @@
           <a:bodyPr/>
           <a:lstStyle/>
           <a:p>
-            <a:endParaRPr lang="en-GB"/>
+            <a:r>
+              <a:rPr lang="en-GB" cap="none" smtClean="0"/>
+              <a:t>Particle System</a:t>
+            </a:r>
+            <a:endParaRPr lang="en-GB" cap="none" dirty="0"/>
           </a:p>
         </p:txBody>
       </p:sp>
@@ -5056,7 +5062,6 @@
               <a:rPr lang="en-GB" dirty="0" smtClean="0"/>
               <a:t>The 1D positions represent a cell</a:t>
             </a:r>
-            <a:endParaRPr lang="en-GB" dirty="0" smtClean="0"/>
           </a:p>
         </p:txBody>
       </p:sp>
@@ -5514,8 +5519,8 @@
           </a:p>
         </p:txBody>
       </p:sp>
-      <mc:AlternateContent xmlns:mc="http://schemas.openxmlformats.org/markup-compatibility/2006">
-        <mc:Choice xmlns:a14="http://schemas.microsoft.com/office/drawing/2010/main" Requires="a14">
+      <mc:AlternateContent xmlns:mc="http://schemas.openxmlformats.org/markup-compatibility/2006" xmlns:a14="http://schemas.microsoft.com/office/drawing/2010/main">
+        <mc:Choice Requires="a14">
           <p:sp>
             <p:nvSpPr>
               <p:cNvPr id="3" name="Content Placeholder 2"/>
@@ -5765,7 +5770,7 @@
             </p:txBody>
           </p:sp>
         </mc:Choice>
-        <mc:Fallback>
+        <mc:Fallback xmlns="">
           <p:sp>
             <p:nvSpPr>
               <p:cNvPr id="3" name="Content Placeholder 2"/>
@@ -5859,8 +5864,8 @@
           </a:p>
         </p:txBody>
       </p:sp>
-      <mc:AlternateContent xmlns:mc="http://schemas.openxmlformats.org/markup-compatibility/2006">
-        <mc:Choice xmlns:a14="http://schemas.microsoft.com/office/drawing/2010/main" Requires="a14">
+      <mc:AlternateContent xmlns:mc="http://schemas.openxmlformats.org/markup-compatibility/2006" xmlns:a14="http://schemas.microsoft.com/office/drawing/2010/main">
+        <mc:Choice Requires="a14">
           <p:sp>
             <p:nvSpPr>
               <p:cNvPr id="3" name="Content Placeholder 2"/>
@@ -6153,7 +6158,7 @@
             </p:txBody>
           </p:sp>
         </mc:Choice>
-        <mc:Fallback>
+        <mc:Fallback xmlns="">
           <p:sp>
             <p:nvSpPr>
               <p:cNvPr id="3" name="Content Placeholder 2"/>

</xml_diff>